<commit_message>
Fixed some typos in Generics presentation
Fixed some typos in Generics presentation
</commit_message>
<xml_diff>
--- a/CSharpProgramming/Presentations/FurtherParam/Generics.pptx
+++ b/CSharpProgramming/Presentations/FurtherParam/Generics.pptx
@@ -281,7 +281,7 @@
           <a:p>
             <a:fld id="{E15B7D8E-2A20-4C0E-991C-872DBB7459A8}" type="datetimeFigureOut">
               <a:rPr lang="da-DK" smtClean="0"/>
-              <a:t>04-02-2018</a:t>
+              <a:t>06-02-2018</a:t>
             </a:fld>
             <a:endParaRPr lang="da-DK"/>
           </a:p>
@@ -451,7 +451,7 @@
           <a:p>
             <a:fld id="{E15B7D8E-2A20-4C0E-991C-872DBB7459A8}" type="datetimeFigureOut">
               <a:rPr lang="da-DK" smtClean="0"/>
-              <a:t>04-02-2018</a:t>
+              <a:t>06-02-2018</a:t>
             </a:fld>
             <a:endParaRPr lang="da-DK"/>
           </a:p>
@@ -631,7 +631,7 @@
           <a:p>
             <a:fld id="{E15B7D8E-2A20-4C0E-991C-872DBB7459A8}" type="datetimeFigureOut">
               <a:rPr lang="da-DK" smtClean="0"/>
-              <a:t>04-02-2018</a:t>
+              <a:t>06-02-2018</a:t>
             </a:fld>
             <a:endParaRPr lang="da-DK"/>
           </a:p>
@@ -801,7 +801,7 @@
           <a:p>
             <a:fld id="{E15B7D8E-2A20-4C0E-991C-872DBB7459A8}" type="datetimeFigureOut">
               <a:rPr lang="da-DK" smtClean="0"/>
-              <a:t>04-02-2018</a:t>
+              <a:t>06-02-2018</a:t>
             </a:fld>
             <a:endParaRPr lang="da-DK"/>
           </a:p>
@@ -1047,7 +1047,7 @@
           <a:p>
             <a:fld id="{E15B7D8E-2A20-4C0E-991C-872DBB7459A8}" type="datetimeFigureOut">
               <a:rPr lang="da-DK" smtClean="0"/>
-              <a:t>04-02-2018</a:t>
+              <a:t>06-02-2018</a:t>
             </a:fld>
             <a:endParaRPr lang="da-DK"/>
           </a:p>
@@ -1279,7 +1279,7 @@
           <a:p>
             <a:fld id="{E15B7D8E-2A20-4C0E-991C-872DBB7459A8}" type="datetimeFigureOut">
               <a:rPr lang="da-DK" smtClean="0"/>
-              <a:t>04-02-2018</a:t>
+              <a:t>06-02-2018</a:t>
             </a:fld>
             <a:endParaRPr lang="da-DK"/>
           </a:p>
@@ -1646,7 +1646,7 @@
           <a:p>
             <a:fld id="{E15B7D8E-2A20-4C0E-991C-872DBB7459A8}" type="datetimeFigureOut">
               <a:rPr lang="da-DK" smtClean="0"/>
-              <a:t>04-02-2018</a:t>
+              <a:t>06-02-2018</a:t>
             </a:fld>
             <a:endParaRPr lang="da-DK"/>
           </a:p>
@@ -1764,7 +1764,7 @@
           <a:p>
             <a:fld id="{E15B7D8E-2A20-4C0E-991C-872DBB7459A8}" type="datetimeFigureOut">
               <a:rPr lang="da-DK" smtClean="0"/>
-              <a:t>04-02-2018</a:t>
+              <a:t>06-02-2018</a:t>
             </a:fld>
             <a:endParaRPr lang="da-DK"/>
           </a:p>
@@ -1859,7 +1859,7 @@
           <a:p>
             <a:fld id="{E15B7D8E-2A20-4C0E-991C-872DBB7459A8}" type="datetimeFigureOut">
               <a:rPr lang="da-DK" smtClean="0"/>
-              <a:t>04-02-2018</a:t>
+              <a:t>06-02-2018</a:t>
             </a:fld>
             <a:endParaRPr lang="da-DK"/>
           </a:p>
@@ -2136,7 +2136,7 @@
           <a:p>
             <a:fld id="{E15B7D8E-2A20-4C0E-991C-872DBB7459A8}" type="datetimeFigureOut">
               <a:rPr lang="da-DK" smtClean="0"/>
-              <a:t>04-02-2018</a:t>
+              <a:t>06-02-2018</a:t>
             </a:fld>
             <a:endParaRPr lang="da-DK"/>
           </a:p>
@@ -2389,7 +2389,7 @@
           <a:p>
             <a:fld id="{E15B7D8E-2A20-4C0E-991C-872DBB7459A8}" type="datetimeFigureOut">
               <a:rPr lang="da-DK" smtClean="0"/>
-              <a:t>04-02-2018</a:t>
+              <a:t>06-02-2018</a:t>
             </a:fld>
             <a:endParaRPr lang="da-DK"/>
           </a:p>
@@ -2602,7 +2602,7 @@
           <a:p>
             <a:fld id="{E15B7D8E-2A20-4C0E-991C-872DBB7459A8}" type="datetimeFigureOut">
               <a:rPr lang="da-DK" smtClean="0"/>
-              <a:t>04-02-2018</a:t>
+              <a:t>06-02-2018</a:t>
             </a:fld>
             <a:endParaRPr lang="da-DK"/>
           </a:p>
@@ -3798,9 +3798,20 @@
             </a:r>
             <a:r>
               <a:rPr lang="en-US" sz="3200" b="1">
-                <a:latin typeface="Consolas" panose="020B0609020204030204" pitchFamily="49" charset="0"/>
-              </a:rPr>
-              <a:t>T Create()</a:t>
+                <a:solidFill>
+                  <a:schemeClr val="accent6">
+                    <a:lumMod val="75000"/>
+                  </a:schemeClr>
+                </a:solidFill>
+                <a:latin typeface="Consolas" panose="020B0609020204030204" pitchFamily="49" charset="0"/>
+              </a:rPr>
+              <a:t>T</a:t>
+            </a:r>
+            <a:r>
+              <a:rPr lang="en-US" sz="3200" b="1">
+                <a:latin typeface="Consolas" panose="020B0609020204030204" pitchFamily="49" charset="0"/>
+              </a:rPr>
+              <a:t> Create()</a:t>
             </a:r>
           </a:p>
           <a:p>
@@ -3838,9 +3849,20 @@
             </a:r>
             <a:r>
               <a:rPr lang="en-US" sz="3200" b="1">
-                <a:latin typeface="Consolas" panose="020B0609020204030204" pitchFamily="49" charset="0"/>
-              </a:rPr>
-              <a:t>T();</a:t>
+                <a:solidFill>
+                  <a:schemeClr val="accent6">
+                    <a:lumMod val="75000"/>
+                  </a:schemeClr>
+                </a:solidFill>
+                <a:latin typeface="Consolas" panose="020B0609020204030204" pitchFamily="49" charset="0"/>
+              </a:rPr>
+              <a:t>T</a:t>
+            </a:r>
+            <a:r>
+              <a:rPr lang="en-US" sz="3200" b="1">
+                <a:latin typeface="Consolas" panose="020B0609020204030204" pitchFamily="49" charset="0"/>
+              </a:rPr>
+              <a:t>();</a:t>
             </a:r>
           </a:p>
           <a:p>
@@ -4246,9 +4268,20 @@
             </a:r>
             <a:r>
               <a:rPr lang="en-US" sz="3200" b="1">
-                <a:latin typeface="Consolas" panose="020B0609020204030204" pitchFamily="49" charset="0"/>
-              </a:rPr>
-              <a:t>T Create()</a:t>
+                <a:solidFill>
+                  <a:schemeClr val="accent6">
+                    <a:lumMod val="75000"/>
+                  </a:schemeClr>
+                </a:solidFill>
+                <a:latin typeface="Consolas" panose="020B0609020204030204" pitchFamily="49" charset="0"/>
+              </a:rPr>
+              <a:t>T</a:t>
+            </a:r>
+            <a:r>
+              <a:rPr lang="en-US" sz="3200" b="1">
+                <a:latin typeface="Consolas" panose="020B0609020204030204" pitchFamily="49" charset="0"/>
+              </a:rPr>
+              <a:t> Create()</a:t>
             </a:r>
           </a:p>
           <a:p>
@@ -4286,9 +4319,20 @@
             </a:r>
             <a:r>
               <a:rPr lang="en-US" sz="3200" b="1">
-                <a:latin typeface="Consolas" panose="020B0609020204030204" pitchFamily="49" charset="0"/>
-              </a:rPr>
-              <a:t>T();</a:t>
+                <a:solidFill>
+                  <a:schemeClr val="accent6">
+                    <a:lumMod val="75000"/>
+                  </a:schemeClr>
+                </a:solidFill>
+                <a:latin typeface="Consolas" panose="020B0609020204030204" pitchFamily="49" charset="0"/>
+              </a:rPr>
+              <a:t>T</a:t>
+            </a:r>
+            <a:r>
+              <a:rPr lang="en-US" sz="3200" b="1">
+                <a:latin typeface="Consolas" panose="020B0609020204030204" pitchFamily="49" charset="0"/>
+              </a:rPr>
+              <a:t>();</a:t>
             </a:r>
           </a:p>
           <a:p>
@@ -8852,7 +8896,11 @@
             <a:pPr algn="ctr"/>
             <a:r>
               <a:rPr lang="da-DK" sz="3600" smtClean="0"/>
-              <a:t>Animal&gt;</a:t>
+              <a:t>C&lt;Animal</a:t>
+            </a:r>
+            <a:r>
+              <a:rPr lang="da-DK" sz="3600" smtClean="0"/>
+              <a:t>&gt;</a:t>
             </a:r>
             <a:endParaRPr lang="da-DK" sz="3600"/>
           </a:p>
@@ -11025,7 +11073,11 @@
             <a:pPr algn="ctr"/>
             <a:r>
               <a:rPr lang="da-DK" sz="3600" smtClean="0"/>
-              <a:t>Animal&gt;</a:t>
+              <a:t>C&lt;Animal</a:t>
+            </a:r>
+            <a:r>
+              <a:rPr lang="da-DK" sz="3600" smtClean="0"/>
+              <a:t>&gt;</a:t>
             </a:r>
             <a:endParaRPr lang="da-DK" sz="3600"/>
           </a:p>
@@ -11395,7 +11447,11 @@
             <a:pPr algn="ctr"/>
             <a:r>
               <a:rPr lang="da-DK" sz="2800" smtClean="0"/>
-              <a:t>ICSet&lt;Dog&gt;</a:t>
+              <a:t>ISet&lt;Dog</a:t>
+            </a:r>
+            <a:r>
+              <a:rPr lang="da-DK" sz="2800" smtClean="0"/>
+              <a:t>&gt;</a:t>
             </a:r>
             <a:endParaRPr lang="da-DK" sz="2800"/>
           </a:p>

</xml_diff>